<commit_message>
Added icons on all buttons.
</commit_message>
<xml_diff>
--- a/documentation/Living-Real-Presentation.pptx
+++ b/documentation/Living-Real-Presentation.pptx
@@ -16812,7 +16812,7 @@
         <p:spPr>
           <a:xfrm>
             <a:off x="4983481" y="1824106"/>
-            <a:ext cx="3779519" cy="4555093"/>
+            <a:ext cx="3779519" cy="5109091"/>
           </a:xfrm>
           <a:prstGeom prst="rect">
             <a:avLst/>
@@ -16847,7 +16847,7 @@
             </a:pPr>
             <a:r>
               <a:rPr lang="en-US" sz="1200" dirty="0"/>
-              <a:t>Cameron laid out the application structure and framework.</a:t>
+              <a:t>Cameron laid out the application structure and framework, worked on the frontend, CSS, and the carousel, as well as assisting with the backend.</a:t>
             </a:r>
             <a:br>
               <a:rPr lang="en-US" sz="1200" dirty="0"/>
@@ -16911,7 +16911,7 @@
             </a:pPr>
             <a:r>
               <a:rPr lang="en-US" sz="1200" dirty="0"/>
-              <a:t>Grey created the backend and the PWA capabilities.</a:t>
+              <a:t>Grey created the backend and the PWA capabilities, helped with the frontend and styling.</a:t>
             </a:r>
             <a:br>
               <a:rPr lang="en-US" sz="1200" dirty="0"/>
@@ -16954,7 +16954,7 @@
         <p:spPr>
           <a:xfrm>
             <a:off x="327659" y="4473714"/>
-            <a:ext cx="4602481" cy="1631216"/>
+            <a:ext cx="4602481" cy="1846659"/>
           </a:xfrm>
           <a:prstGeom prst="rect">
             <a:avLst/>
@@ -17016,6 +17016,17 @@
             <a:r>
               <a:rPr lang="en-US" dirty="0"/>
               <a:t>Challenging use of ‘state’.</a:t>
+            </a:r>
+          </a:p>
+          <a:p>
+            <a:pPr marL="571500" lvl="1" indent="-285750">
+              <a:buSzPts val="2800"/>
+              <a:buFont typeface="Arial" panose="020B0604020202020204" pitchFamily="34" charset="0"/>
+              <a:buChar char="•"/>
+            </a:pPr>
+            <a:r>
+              <a:rPr lang="en-US" dirty="0"/>
+              <a:t>Dumped use of Semantic UI.</a:t>
             </a:r>
           </a:p>
           <a:p>

</xml_diff>